<commit_message>
update matlab file + update open model + open model pdf
</commit_message>
<xml_diff>
--- a/Final_Project/finalProject_open10938038.pptx
+++ b/Final_Project/finalProject_open10938038.pptx
@@ -8365,28 +8365,6 @@
           </a:p>
         </p:txBody>
       </p:sp>
-      <p:pic>
-        <p:nvPicPr>
-          <p:cNvPr id="3" name="object 3"/>
-          <p:cNvPicPr/>
-          <p:nvPr/>
-        </p:nvPicPr>
-        <p:blipFill>
-          <a:blip r:embed="rId2" cstate="print"/>
-          <a:stretch>
-            <a:fillRect/>
-          </a:stretch>
-        </p:blipFill>
-        <p:spPr>
-          <a:xfrm>
-            <a:off x="4039219" y="1923986"/>
-            <a:ext cx="891699" cy="892770"/>
-          </a:xfrm>
-          <a:prstGeom prst="rect">
-            <a:avLst/>
-          </a:prstGeom>
-        </p:spPr>
-      </p:pic>
       <p:sp>
         <p:nvSpPr>
           <p:cNvPr id="4" name="object 4"/>
@@ -8395,7 +8373,7 @@
         </p:nvSpPr>
         <p:spPr>
           <a:xfrm>
-            <a:off x="3826259" y="3232556"/>
+            <a:off x="3822763" y="2525928"/>
             <a:ext cx="1324610" cy="154940"/>
           </a:xfrm>
           <a:custGeom>
@@ -9696,7 +9674,7 @@
         </p:nvSpPr>
         <p:spPr>
           <a:xfrm>
-            <a:off x="3493091" y="2914777"/>
+            <a:off x="3491293" y="2207437"/>
             <a:ext cx="1987550" cy="221615"/>
           </a:xfrm>
           <a:custGeom>
@@ -11339,7 +11317,7 @@
         <p:spPr>
           <a:xfrm>
             <a:off x="726135" y="1727403"/>
-            <a:ext cx="7431405" cy="1705595"/>
+            <a:ext cx="7431405" cy="1808187"/>
           </a:xfrm>
           <a:prstGeom prst="rect">
             <a:avLst/>
@@ -11499,8 +11477,12 @@
                 <a:latin typeface="Calibri"/>
                 <a:cs typeface="Calibri"/>
               </a:rPr>
-              <a:t>Source and deterministic arrival rate</a:t>
-            </a:r>
+              <a:t>Source.</a:t>
+            </a:r>
+            <a:endParaRPr lang="it-IT" sz="1800" dirty="0">
+              <a:latin typeface="Calibri"/>
+              <a:cs typeface="Calibri"/>
+            </a:endParaRPr>
           </a:p>
           <a:p>
             <a:pPr>
@@ -11510,10 +11492,22 @@
               <a:spcBef>
                 <a:spcPts val="830"/>
               </a:spcBef>
-              <a:buFont typeface="Courier New"/>
-              <a:buChar char="o"/>
             </a:pPr>
-            <a:endParaRPr lang="it-IT" sz="1800" dirty="0">
+            <a:endParaRPr lang="en-US" dirty="0">
+              <a:latin typeface="Calibri"/>
+              <a:cs typeface="Calibri"/>
+            </a:endParaRPr>
+          </a:p>
+          <a:p>
+            <a:pPr>
+              <a:lnSpc>
+                <a:spcPct val="100000"/>
+              </a:lnSpc>
+              <a:spcBef>
+                <a:spcPts val="830"/>
+              </a:spcBef>
+            </a:pPr>
+            <a:endParaRPr lang="en-US" dirty="0">
               <a:latin typeface="Calibri"/>
               <a:cs typeface="Calibri"/>
             </a:endParaRPr>
@@ -13676,7 +13670,21 @@
                 <a:latin typeface="Calibri"/>
                 <a:cs typeface="Calibri"/>
               </a:rPr>
-              <a:t> are VFX and Video Editing =&gt; I decide to set 2 servers for </a:t>
+              <a:t> are VFX and Video Editing =&gt; I decide to set </a:t>
+            </a:r>
+            <a:r>
+              <a:rPr lang="it-IT" sz="1600" b="1" spc="-25" dirty="0">
+                <a:latin typeface="Calibri"/>
+                <a:cs typeface="Calibri"/>
+              </a:rPr>
+              <a:t>2 servers </a:t>
+            </a:r>
+            <a:r>
+              <a:rPr lang="it-IT" sz="1600" spc="-25" dirty="0">
+                <a:latin typeface="Calibri"/>
+                <a:cs typeface="Calibri"/>
+              </a:rPr>
+              <a:t>for </a:t>
             </a:r>
             <a:r>
               <a:rPr lang="it-IT" sz="1600" b="1" spc="-25" dirty="0" err="1">
@@ -19219,17 +19227,24 @@
                 <a:latin typeface="Calibri"/>
                 <a:cs typeface="Calibri"/>
               </a:rPr>
-              <a:t>n open</a:t>
-            </a:r>
-            <a:r>
-              <a:rPr sz="1800" dirty="0">
+              <a:t>n </a:t>
+            </a:r>
+            <a:r>
+              <a:rPr lang="it-IT" b="1" spc="-25" dirty="0">
+                <a:latin typeface="Calibri"/>
+                <a:cs typeface="Calibri"/>
+              </a:rPr>
+              <a:t>open</a:t>
+            </a:r>
+            <a:r>
+              <a:rPr sz="1800" b="1" dirty="0">
                 <a:latin typeface="Calibri"/>
                 <a:cs typeface="Calibri"/>
               </a:rPr>
               <a:t>,</a:t>
             </a:r>
             <a:r>
-              <a:rPr sz="1800" spc="-35" dirty="0">
+              <a:rPr sz="1800" b="1" spc="-35" dirty="0">
                 <a:latin typeface="Calibri"/>
                 <a:cs typeface="Calibri"/>
               </a:rPr>

</xml_diff>